<commit_message>
Updated charts images in the slide show.
</commit_message>
<xml_diff>
--- a/Proj 3 PP.pptx
+++ b/Proj 3 PP.pptx
@@ -4641,19 +4641,17 @@
       </p:sp>
       <p:pic>
         <p:nvPicPr>
-          <p:cNvPr id="7" name="Content Placeholder 6" descr="Chart, bar chart&#10;&#10;Description automatically generated">
+          <p:cNvPr id="6" name="Picture 5" descr="Chart, bar chart&#10;&#10;Description automatically generated">
             <a:extLst>
               <a:ext uri="{FF2B5EF4-FFF2-40B4-BE49-F238E27FC236}">
-                <a16:creationId xmlns:a16="http://schemas.microsoft.com/office/drawing/2014/main" id="{E38DB5F7-3784-5E61-B2B5-0BF74E98DD7A}"/>
+                <a16:creationId xmlns:a16="http://schemas.microsoft.com/office/drawing/2014/main" id="{FED9DC95-37F0-BF50-EE8A-8822723488A9}"/>
               </a:ext>
             </a:extLst>
           </p:cNvPr>
           <p:cNvPicPr>
-            <a:picLocks noGrp="1" noChangeAspect="1"/>
+            <a:picLocks noChangeAspect="1"/>
           </p:cNvPicPr>
-          <p:nvPr>
-            <p:ph idx="1"/>
-          </p:nvPr>
+          <p:nvPr/>
         </p:nvPicPr>
         <p:blipFill>
           <a:blip r:embed="rId3"/>
@@ -4663,9 +4661,12 @@
         </p:blipFill>
         <p:spPr>
           <a:xfrm>
-            <a:off x="1779336" y="2276643"/>
-            <a:ext cx="8120452" cy="3346116"/>
+            <a:off x="1152330" y="1980261"/>
+            <a:ext cx="9887339" cy="4299241"/>
           </a:xfrm>
+          <a:prstGeom prst="rect">
+            <a:avLst/>
+          </a:prstGeom>
         </p:spPr>
       </p:pic>
     </p:spTree>
@@ -4733,19 +4734,17 @@
       </p:sp>
       <p:pic>
         <p:nvPicPr>
-          <p:cNvPr id="5" name="Content Placeholder 4" descr="Chart, sunburst chart&#10;&#10;Description automatically generated">
+          <p:cNvPr id="4" name="Picture 3" descr="Chart, sunburst chart&#10;&#10;Description automatically generated">
             <a:extLst>
               <a:ext uri="{FF2B5EF4-FFF2-40B4-BE49-F238E27FC236}">
-                <a16:creationId xmlns:a16="http://schemas.microsoft.com/office/drawing/2014/main" id="{12222D7A-397C-1800-6BF5-B40E96A7D363}"/>
+                <a16:creationId xmlns:a16="http://schemas.microsoft.com/office/drawing/2014/main" id="{FF49ED85-B9C2-57AD-3F16-C7140222B3C1}"/>
               </a:ext>
             </a:extLst>
           </p:cNvPr>
           <p:cNvPicPr>
-            <a:picLocks noGrp="1" noChangeAspect="1"/>
+            <a:picLocks noChangeAspect="1"/>
           </p:cNvPicPr>
-          <p:nvPr>
-            <p:ph idx="1"/>
-          </p:nvPr>
+          <p:nvPr/>
         </p:nvPicPr>
         <p:blipFill>
           <a:blip r:embed="rId2"/>
@@ -4755,9 +4754,12 @@
         </p:blipFill>
         <p:spPr>
           <a:xfrm>
-            <a:off x="2360645" y="1953069"/>
-            <a:ext cx="6876660" cy="4357606"/>
+            <a:off x="2877016" y="1942044"/>
+            <a:ext cx="6437968" cy="4351751"/>
           </a:xfrm>
+          <a:prstGeom prst="rect">
+            <a:avLst/>
+          </a:prstGeom>
         </p:spPr>
       </p:pic>
     </p:spTree>
@@ -4825,10 +4827,10 @@
       </p:sp>
       <p:pic>
         <p:nvPicPr>
-          <p:cNvPr id="5" name="Content Placeholder 4" descr="Chart, radar chart&#10;&#10;Description automatically generated">
+          <p:cNvPr id="7" name="Content Placeholder 6" descr="Chart, radar chart">
             <a:extLst>
               <a:ext uri="{FF2B5EF4-FFF2-40B4-BE49-F238E27FC236}">
-                <a16:creationId xmlns:a16="http://schemas.microsoft.com/office/drawing/2014/main" id="{DDE5F18F-1940-D1C0-4544-819A356C3647}"/>
+                <a16:creationId xmlns:a16="http://schemas.microsoft.com/office/drawing/2014/main" id="{5FAA0333-F485-2FC7-F9FD-9C66F06420BB}"/>
               </a:ext>
             </a:extLst>
           </p:cNvPr>
@@ -4847,8 +4849,8 @@
         </p:blipFill>
         <p:spPr>
           <a:xfrm>
-            <a:off x="2687215" y="2030287"/>
-            <a:ext cx="6288833" cy="4265974"/>
+            <a:off x="2771456" y="1942828"/>
+            <a:ext cx="6649088" cy="4407523"/>
           </a:xfrm>
         </p:spPr>
       </p:pic>
@@ -5585,21 +5587,21 @@
 </file>
 
 <file path=customXml/item1.xml><?xml version="1.0" encoding="utf-8"?>
+<?mso-contentType ?>
+<FormTemplates xmlns="http://schemas.microsoft.com/sharepoint/v3/contenttype/forms">
+  <Display>DocumentLibraryForm</Display>
+  <Edit>DocumentLibraryForm</Edit>
+  <New>DocumentLibraryForm</New>
+</FormTemplates>
+</file>
+
+<file path=customXml/item2.xml><?xml version="1.0" encoding="utf-8"?>
 <p:properties xmlns:p="http://schemas.microsoft.com/office/2006/metadata/properties" xmlns:xsi="http://www.w3.org/2001/XMLSchema-instance" xmlns:pc="http://schemas.microsoft.com/office/infopath/2007/PartnerControls">
   <documentManagement>
     <Status xmlns="71af3243-3dd4-4a8d-8c0d-dd76da1f02a5">Not started</Status>
     <MediaServiceKeyPoints xmlns="71af3243-3dd4-4a8d-8c0d-dd76da1f02a5" xsi:nil="true"/>
   </documentManagement>
 </p:properties>
-</file>
-
-<file path=customXml/item2.xml><?xml version="1.0" encoding="utf-8"?>
-<?mso-contentType ?>
-<FormTemplates xmlns="http://schemas.microsoft.com/sharepoint/v3/contenttype/forms">
-  <Display>DocumentLibraryForm</Display>
-  <Edit>DocumentLibraryForm</Edit>
-  <New>DocumentLibraryForm</New>
-</FormTemplates>
 </file>
 
 <file path=customXml/item3.xml><?xml version="1.0" encoding="utf-8"?>
@@ -5824,19 +5826,19 @@
 </file>
 
 <file path=customXml/itemProps1.xml><?xml version="1.0" encoding="utf-8"?>
+<ds:datastoreItem xmlns:ds="http://schemas.openxmlformats.org/officeDocument/2006/customXml" ds:itemID="{AA3F7EDC-E5B4-4BBC-9D2A-CBE6D46C37AD}">
+  <ds:schemaRefs>
+    <ds:schemaRef ds:uri="http://schemas.microsoft.com/sharepoint/v3/contenttype/forms"/>
+  </ds:schemaRefs>
+</ds:datastoreItem>
+</file>
+
+<file path=customXml/itemProps2.xml><?xml version="1.0" encoding="utf-8"?>
 <ds:datastoreItem xmlns:ds="http://schemas.openxmlformats.org/officeDocument/2006/customXml" ds:itemID="{A03EEFF0-FB57-4CB4-8BFC-DF397689E2ED}">
   <ds:schemaRefs>
     <ds:schemaRef ds:uri="http://schemas.microsoft.com/office/2006/metadata/properties"/>
     <ds:schemaRef ds:uri="http://schemas.microsoft.com/office/infopath/2007/PartnerControls"/>
     <ds:schemaRef ds:uri="71af3243-3dd4-4a8d-8c0d-dd76da1f02a5"/>
-  </ds:schemaRefs>
-</ds:datastoreItem>
-</file>
-
-<file path=customXml/itemProps2.xml><?xml version="1.0" encoding="utf-8"?>
-<ds:datastoreItem xmlns:ds="http://schemas.openxmlformats.org/officeDocument/2006/customXml" ds:itemID="{AA3F7EDC-E5B4-4BBC-9D2A-CBE6D46C37AD}">
-  <ds:schemaRefs>
-    <ds:schemaRef ds:uri="http://schemas.microsoft.com/sharepoint/v3/contenttype/forms"/>
   </ds:schemaRefs>
 </ds:datastoreItem>
 </file>

</xml_diff>

<commit_message>
Final adjustments on html file.
</commit_message>
<xml_diff>
--- a/Proj 3 PP.pptx
+++ b/Proj 3 PP.pptx
@@ -9,9 +9,9 @@
     <p:sldId id="300" r:id="rId6"/>
     <p:sldId id="301" r:id="rId7"/>
     <p:sldId id="302" r:id="rId8"/>
-    <p:sldId id="303" r:id="rId9"/>
+    <p:sldId id="310" r:id="rId9"/>
     <p:sldId id="309" r:id="rId10"/>
-    <p:sldId id="310" r:id="rId11"/>
+    <p:sldId id="303" r:id="rId11"/>
     <p:sldId id="304" r:id="rId12"/>
     <p:sldId id="305" r:id="rId13"/>
     <p:sldId id="307" r:id="rId14"/>
@@ -3936,10 +3936,14 @@
             </a:r>
           </a:p>
           <a:p>
-            <a:pPr marL="384048" lvl="2" indent="0">
-              <a:buNone/>
+            <a:pPr lvl="1">
+              <a:buFont typeface="Courier New" panose="02070309020205020404" pitchFamily="49" charset="0"/>
+              <a:buChar char="o"/>
             </a:pPr>
-            <a:endParaRPr lang="en-US" dirty="0"/>
+            <a:r>
+              <a:rPr lang="en-US" dirty="0"/>
+              <a:t>Differences in population density per region.</a:t>
+            </a:r>
           </a:p>
           <a:p>
             <a:pPr marL="384048" lvl="2" indent="0">
@@ -4420,23 +4424,7 @@
                   <a:srgbClr val="FFC000"/>
                 </a:solidFill>
               </a:rPr>
-              <a:t>Dataset/</a:t>
-            </a:r>
-            <a:r>
-              <a:rPr lang="en-US" dirty="0" err="1">
-                <a:solidFill>
-                  <a:srgbClr val="FFC000"/>
-                </a:solidFill>
-              </a:rPr>
-              <a:t>Sqlite</a:t>
-            </a:r>
-            <a:r>
-              <a:rPr lang="en-US" dirty="0">
-                <a:solidFill>
-                  <a:srgbClr val="FFC000"/>
-                </a:solidFill>
-              </a:rPr>
-              <a:t>/Flask</a:t>
+              <a:t>Dataset/SQLite/Flask</a:t>
             </a:r>
           </a:p>
         </p:txBody>
@@ -4485,21 +4473,19 @@
             <a:endParaRPr lang="en-US" dirty="0"/>
           </a:p>
           <a:p>
+            <a:pPr marL="201168" lvl="1" indent="0">
+              <a:buNone/>
+            </a:pPr>
+            <a:endParaRPr lang="en-US" dirty="0"/>
+          </a:p>
+          <a:p>
             <a:pPr lvl="1">
               <a:buFont typeface="Arial" panose="020B0604020202020204" pitchFamily="34" charset="0"/>
               <a:buChar char="•"/>
             </a:pPr>
             <a:r>
               <a:rPr lang="en-US" dirty="0"/>
-              <a:t>Creating </a:t>
-            </a:r>
-            <a:r>
-              <a:rPr lang="en-US" dirty="0" err="1"/>
-              <a:t>Sqlite</a:t>
-            </a:r>
-            <a:r>
-              <a:rPr lang="en-US" dirty="0"/>
-              <a:t> database</a:t>
+              <a:t>Creating SQLite database</a:t>
             </a:r>
           </a:p>
           <a:p>
@@ -4534,10 +4520,10 @@
       </p:sp>
       <p:pic>
         <p:nvPicPr>
-          <p:cNvPr id="7" name="Picture 6" descr="Text&#10;&#10;Description automatically generated">
+          <p:cNvPr id="4" name="Picture 3" descr="Text&#10;&#10;Description automatically generated">
             <a:extLst>
               <a:ext uri="{FF2B5EF4-FFF2-40B4-BE49-F238E27FC236}">
-                <a16:creationId xmlns:a16="http://schemas.microsoft.com/office/drawing/2014/main" id="{D55A54AA-D7B9-204E-CB0E-7633D505F1A5}"/>
+                <a16:creationId xmlns:a16="http://schemas.microsoft.com/office/drawing/2014/main" id="{4B4E17B4-3F52-B44E-F3D4-157CC20DE434}"/>
               </a:ext>
             </a:extLst>
           </p:cNvPr>
@@ -4554,8 +4540,8 @@
         </p:blipFill>
         <p:spPr>
           <a:xfrm>
-            <a:off x="8136739" y="2066322"/>
-            <a:ext cx="2995624" cy="3956836"/>
+            <a:off x="6126480" y="2011837"/>
+            <a:ext cx="2984205" cy="3953617"/>
           </a:xfrm>
           <a:prstGeom prst="rect">
             <a:avLst/>
@@ -4578,14 +4564,6 @@
 <file path=ppt/slides/slide5.xml><?xml version="1.0" encoding="utf-8"?>
 <p:sld xmlns:a="http://schemas.openxmlformats.org/drawingml/2006/main" xmlns:r="http://schemas.openxmlformats.org/officeDocument/2006/relationships" xmlns:p="http://schemas.openxmlformats.org/presentationml/2006/main">
   <p:cSld>
-    <p:bg>
-      <p:bgPr>
-        <a:solidFill>
-          <a:schemeClr val="bg1"/>
-        </a:solidFill>
-        <a:effectLst/>
-      </p:bgPr>
-    </p:bg>
     <p:spTree>
       <p:nvGrpSpPr>
         <p:cNvPr id="1" name=""/>
@@ -4605,7 +4583,7 @@
           <p:cNvPr id="2" name="Title 1">
             <a:extLst>
               <a:ext uri="{FF2B5EF4-FFF2-40B4-BE49-F238E27FC236}">
-                <a16:creationId xmlns:a16="http://schemas.microsoft.com/office/drawing/2014/main" id="{75AC86D3-8FD1-4F47-A319-7D0542E48B2F}"/>
+                <a16:creationId xmlns:a16="http://schemas.microsoft.com/office/drawing/2014/main" id="{73481310-7D72-A957-F243-7CA311E3D6BB}"/>
               </a:ext>
             </a:extLst>
           </p:cNvPr>
@@ -4616,16 +4594,9 @@
             <p:ph type="title"/>
           </p:nvPr>
         </p:nvSpPr>
-        <p:spPr>
-          <a:xfrm>
-            <a:off x="1097280" y="286604"/>
-            <a:ext cx="10058400" cy="1590322"/>
-          </a:xfrm>
-        </p:spPr>
-        <p:txBody>
-          <a:bodyPr vert="horz" lIns="91440" tIns="45720" rIns="91440" bIns="45720" rtlCol="0">
-            <a:normAutofit/>
-          </a:bodyPr>
+        <p:spPr/>
+        <p:txBody>
+          <a:bodyPr/>
           <a:lstStyle/>
           <a:p>
             <a:r>
@@ -4634,45 +4605,45 @@
                   <a:srgbClr val="FFC000"/>
                 </a:solidFill>
               </a:rPr>
-              <a:t>Chart.js (Bar)</a:t>
-            </a:r>
+              <a:t>Chart.js (Radar)</a:t>
+            </a:r>
+            <a:endParaRPr lang="en-US" dirty="0"/>
           </a:p>
         </p:txBody>
       </p:sp>
       <p:pic>
         <p:nvPicPr>
-          <p:cNvPr id="6" name="Picture 5" descr="Chart, bar chart&#10;&#10;Description automatically generated">
+          <p:cNvPr id="7" name="Content Placeholder 6" descr="Chart, radar chart">
             <a:extLst>
               <a:ext uri="{FF2B5EF4-FFF2-40B4-BE49-F238E27FC236}">
-                <a16:creationId xmlns:a16="http://schemas.microsoft.com/office/drawing/2014/main" id="{FED9DC95-37F0-BF50-EE8A-8822723488A9}"/>
+                <a16:creationId xmlns:a16="http://schemas.microsoft.com/office/drawing/2014/main" id="{5FAA0333-F485-2FC7-F9FD-9C66F06420BB}"/>
               </a:ext>
             </a:extLst>
           </p:cNvPr>
           <p:cNvPicPr>
-            <a:picLocks noChangeAspect="1"/>
+            <a:picLocks noGrp="1" noChangeAspect="1"/>
           </p:cNvPicPr>
-          <p:nvPr/>
+          <p:nvPr>
+            <p:ph idx="1"/>
+          </p:nvPr>
         </p:nvPicPr>
         <p:blipFill>
-          <a:blip r:embed="rId3"/>
+          <a:blip r:embed="rId2"/>
           <a:stretch>
             <a:fillRect/>
           </a:stretch>
         </p:blipFill>
         <p:spPr>
           <a:xfrm>
-            <a:off x="1152330" y="1980261"/>
-            <a:ext cx="9887339" cy="4299241"/>
+            <a:off x="2771456" y="1942828"/>
+            <a:ext cx="6649088" cy="4407523"/>
           </a:xfrm>
-          <a:prstGeom prst="rect">
-            <a:avLst/>
-          </a:prstGeom>
         </p:spPr>
       </p:pic>
     </p:spTree>
     <p:extLst>
       <p:ext uri="{BB962C8B-B14F-4D97-AF65-F5344CB8AC3E}">
-        <p14:creationId xmlns:p14="http://schemas.microsoft.com/office/powerpoint/2010/main" val="2159824208"/>
+        <p14:creationId xmlns:p14="http://schemas.microsoft.com/office/powerpoint/2010/main" val="532821506"/>
       </p:ext>
     </p:extLst>
   </p:cSld>
@@ -4778,6 +4749,14 @@
 <file path=ppt/slides/slide7.xml><?xml version="1.0" encoding="utf-8"?>
 <p:sld xmlns:a="http://schemas.openxmlformats.org/drawingml/2006/main" xmlns:r="http://schemas.openxmlformats.org/officeDocument/2006/relationships" xmlns:p="http://schemas.openxmlformats.org/presentationml/2006/main">
   <p:cSld>
+    <p:bg>
+      <p:bgPr>
+        <a:solidFill>
+          <a:schemeClr val="bg1"/>
+        </a:solidFill>
+        <a:effectLst/>
+      </p:bgPr>
+    </p:bg>
     <p:spTree>
       <p:nvGrpSpPr>
         <p:cNvPr id="1" name=""/>
@@ -4797,7 +4776,7 @@
           <p:cNvPr id="2" name="Title 1">
             <a:extLst>
               <a:ext uri="{FF2B5EF4-FFF2-40B4-BE49-F238E27FC236}">
-                <a16:creationId xmlns:a16="http://schemas.microsoft.com/office/drawing/2014/main" id="{73481310-7D72-A957-F243-7CA311E3D6BB}"/>
+                <a16:creationId xmlns:a16="http://schemas.microsoft.com/office/drawing/2014/main" id="{75AC86D3-8FD1-4F47-A319-7D0542E48B2F}"/>
               </a:ext>
             </a:extLst>
           </p:cNvPr>
@@ -4808,9 +4787,16 @@
             <p:ph type="title"/>
           </p:nvPr>
         </p:nvSpPr>
-        <p:spPr/>
-        <p:txBody>
-          <a:bodyPr/>
+        <p:spPr>
+          <a:xfrm>
+            <a:off x="1097280" y="286604"/>
+            <a:ext cx="10058400" cy="1590322"/>
+          </a:xfrm>
+        </p:spPr>
+        <p:txBody>
+          <a:bodyPr vert="horz" lIns="91440" tIns="45720" rIns="91440" bIns="45720" rtlCol="0">
+            <a:normAutofit/>
+          </a:bodyPr>
           <a:lstStyle/>
           <a:p>
             <a:r>
@@ -4819,45 +4805,45 @@
                   <a:srgbClr val="FFC000"/>
                 </a:solidFill>
               </a:rPr>
-              <a:t>Chart.js (Radar)</a:t>
-            </a:r>
-            <a:endParaRPr lang="en-US" dirty="0"/>
+              <a:t>Chart.js (Bar)</a:t>
+            </a:r>
           </a:p>
         </p:txBody>
       </p:sp>
       <p:pic>
         <p:nvPicPr>
-          <p:cNvPr id="7" name="Content Placeholder 6" descr="Chart, radar chart">
+          <p:cNvPr id="4" name="Picture 3" descr="Chart, bar chart&#10;&#10;Description automatically generated">
             <a:extLst>
               <a:ext uri="{FF2B5EF4-FFF2-40B4-BE49-F238E27FC236}">
-                <a16:creationId xmlns:a16="http://schemas.microsoft.com/office/drawing/2014/main" id="{5FAA0333-F485-2FC7-F9FD-9C66F06420BB}"/>
+                <a16:creationId xmlns:a16="http://schemas.microsoft.com/office/drawing/2014/main" id="{6A795A84-1E93-214A-21D2-9538F0E5582A}"/>
               </a:ext>
             </a:extLst>
           </p:cNvPr>
           <p:cNvPicPr>
-            <a:picLocks noGrp="1" noChangeAspect="1"/>
+            <a:picLocks noChangeAspect="1"/>
           </p:cNvPicPr>
-          <p:nvPr>
-            <p:ph idx="1"/>
-          </p:nvPr>
+          <p:nvPr/>
         </p:nvPicPr>
         <p:blipFill>
-          <a:blip r:embed="rId2"/>
+          <a:blip r:embed="rId3"/>
           <a:stretch>
             <a:fillRect/>
           </a:stretch>
         </p:blipFill>
         <p:spPr>
           <a:xfrm>
-            <a:off x="2771456" y="1942828"/>
-            <a:ext cx="6649088" cy="4407523"/>
+            <a:off x="1166036" y="1987624"/>
+            <a:ext cx="10058400" cy="4234671"/>
           </a:xfrm>
+          <a:prstGeom prst="rect">
+            <a:avLst/>
+          </a:prstGeom>
         </p:spPr>
       </p:pic>
     </p:spTree>
     <p:extLst>
       <p:ext uri="{BB962C8B-B14F-4D97-AF65-F5344CB8AC3E}">
-        <p14:creationId xmlns:p14="http://schemas.microsoft.com/office/powerpoint/2010/main" val="532821506"/>
+        <p14:creationId xmlns:p14="http://schemas.microsoft.com/office/powerpoint/2010/main" val="2159824208"/>
       </p:ext>
     </p:extLst>
   </p:cSld>
@@ -5070,7 +5056,7 @@
                   <a:srgbClr val="FF0000"/>
                 </a:solidFill>
               </a:rPr>
-              <a:t>The most common severity in all four region was “Possible Injury”</a:t>
+              <a:t>The most common severity in all four region was “No Injury”</a:t>
             </a:r>
           </a:p>
         </p:txBody>
@@ -5587,21 +5573,21 @@
 </file>
 
 <file path=customXml/item1.xml><?xml version="1.0" encoding="utf-8"?>
+<p:properties xmlns:p="http://schemas.microsoft.com/office/2006/metadata/properties" xmlns:xsi="http://www.w3.org/2001/XMLSchema-instance" xmlns:pc="http://schemas.microsoft.com/office/infopath/2007/PartnerControls">
+  <documentManagement>
+    <Status xmlns="71af3243-3dd4-4a8d-8c0d-dd76da1f02a5">Not started</Status>
+    <MediaServiceKeyPoints xmlns="71af3243-3dd4-4a8d-8c0d-dd76da1f02a5" xsi:nil="true"/>
+  </documentManagement>
+</p:properties>
+</file>
+
+<file path=customXml/item2.xml><?xml version="1.0" encoding="utf-8"?>
 <?mso-contentType ?>
 <FormTemplates xmlns="http://schemas.microsoft.com/sharepoint/v3/contenttype/forms">
   <Display>DocumentLibraryForm</Display>
   <Edit>DocumentLibraryForm</Edit>
   <New>DocumentLibraryForm</New>
 </FormTemplates>
-</file>
-
-<file path=customXml/item2.xml><?xml version="1.0" encoding="utf-8"?>
-<p:properties xmlns:p="http://schemas.microsoft.com/office/2006/metadata/properties" xmlns:xsi="http://www.w3.org/2001/XMLSchema-instance" xmlns:pc="http://schemas.microsoft.com/office/infopath/2007/PartnerControls">
-  <documentManagement>
-    <Status xmlns="71af3243-3dd4-4a8d-8c0d-dd76da1f02a5">Not started</Status>
-    <MediaServiceKeyPoints xmlns="71af3243-3dd4-4a8d-8c0d-dd76da1f02a5" xsi:nil="true"/>
-  </documentManagement>
-</p:properties>
 </file>
 
 <file path=customXml/item3.xml><?xml version="1.0" encoding="utf-8"?>
@@ -5826,19 +5812,19 @@
 </file>
 
 <file path=customXml/itemProps1.xml><?xml version="1.0" encoding="utf-8"?>
-<ds:datastoreItem xmlns:ds="http://schemas.openxmlformats.org/officeDocument/2006/customXml" ds:itemID="{AA3F7EDC-E5B4-4BBC-9D2A-CBE6D46C37AD}">
+<ds:datastoreItem xmlns:ds="http://schemas.openxmlformats.org/officeDocument/2006/customXml" ds:itemID="{A03EEFF0-FB57-4CB4-8BFC-DF397689E2ED}">
   <ds:schemaRefs>
-    <ds:schemaRef ds:uri="http://schemas.microsoft.com/sharepoint/v3/contenttype/forms"/>
+    <ds:schemaRef ds:uri="http://schemas.microsoft.com/office/2006/metadata/properties"/>
+    <ds:schemaRef ds:uri="http://schemas.microsoft.com/office/infopath/2007/PartnerControls"/>
+    <ds:schemaRef ds:uri="71af3243-3dd4-4a8d-8c0d-dd76da1f02a5"/>
   </ds:schemaRefs>
 </ds:datastoreItem>
 </file>
 
 <file path=customXml/itemProps2.xml><?xml version="1.0" encoding="utf-8"?>
-<ds:datastoreItem xmlns:ds="http://schemas.openxmlformats.org/officeDocument/2006/customXml" ds:itemID="{A03EEFF0-FB57-4CB4-8BFC-DF397689E2ED}">
+<ds:datastoreItem xmlns:ds="http://schemas.openxmlformats.org/officeDocument/2006/customXml" ds:itemID="{AA3F7EDC-E5B4-4BBC-9D2A-CBE6D46C37AD}">
   <ds:schemaRefs>
-    <ds:schemaRef ds:uri="http://schemas.microsoft.com/office/2006/metadata/properties"/>
-    <ds:schemaRef ds:uri="http://schemas.microsoft.com/office/infopath/2007/PartnerControls"/>
-    <ds:schemaRef ds:uri="71af3243-3dd4-4a8d-8c0d-dd76da1f02a5"/>
+    <ds:schemaRef ds:uri="http://schemas.microsoft.com/sharepoint/v3/contenttype/forms"/>
   </ds:schemaRefs>
 </ds:datastoreItem>
 </file>

</xml_diff>